<commit_message>
update code and upload data
</commit_message>
<xml_diff>
--- a/misc/blackjack figures.pptx
+++ b/misc/blackjack figures.pptx
@@ -6,6 +6,7 @@
   </p:sldMasterIdLst>
   <p:sldIdLst>
     <p:sldId id="256" r:id="rId2"/>
+    <p:sldId id="257" r:id="rId3"/>
   </p:sldIdLst>
   <p:sldSz cx="9144000" cy="6858000" type="screen4x3"/>
   <p:notesSz cx="6858000" cy="9144000"/>
@@ -288,7 +289,8 @@
           <a:p>
             <a:fld id="{EBFE5809-C24E-4064-B123-6E0B0B45228D}" type="datetimeFigureOut">
               <a:rPr lang="en-US" smtClean="0"/>
-              <a:t>3/19/2017</a:t>
+              <a:pPr/>
+              <a:t>3/22/2017</a:t>
             </a:fld>
             <a:endParaRPr lang="en-US"/>
           </a:p>
@@ -330,6 +332,7 @@
           <a:p>
             <a:fld id="{CB0C188A-6774-43C7-A243-7949E5A0860B}" type="slidenum">
               <a:rPr lang="en-US" smtClean="0"/>
+              <a:pPr/>
               <a:t>‹#›</a:t>
             </a:fld>
             <a:endParaRPr lang="en-US"/>
@@ -453,7 +456,8 @@
           <a:p>
             <a:fld id="{EBFE5809-C24E-4064-B123-6E0B0B45228D}" type="datetimeFigureOut">
               <a:rPr lang="en-US" smtClean="0"/>
-              <a:t>3/19/2017</a:t>
+              <a:pPr/>
+              <a:t>3/22/2017</a:t>
             </a:fld>
             <a:endParaRPr lang="en-US"/>
           </a:p>
@@ -495,6 +499,7 @@
           <a:p>
             <a:fld id="{CB0C188A-6774-43C7-A243-7949E5A0860B}" type="slidenum">
               <a:rPr lang="en-US" smtClean="0"/>
+              <a:pPr/>
               <a:t>‹#›</a:t>
             </a:fld>
             <a:endParaRPr lang="en-US"/>
@@ -628,7 +633,8 @@
           <a:p>
             <a:fld id="{EBFE5809-C24E-4064-B123-6E0B0B45228D}" type="datetimeFigureOut">
               <a:rPr lang="en-US" smtClean="0"/>
-              <a:t>3/19/2017</a:t>
+              <a:pPr/>
+              <a:t>3/22/2017</a:t>
             </a:fld>
             <a:endParaRPr lang="en-US"/>
           </a:p>
@@ -670,6 +676,7 @@
           <a:p>
             <a:fld id="{CB0C188A-6774-43C7-A243-7949E5A0860B}" type="slidenum">
               <a:rPr lang="en-US" smtClean="0"/>
+              <a:pPr/>
               <a:t>‹#›</a:t>
             </a:fld>
             <a:endParaRPr lang="en-US"/>
@@ -793,7 +800,8 @@
           <a:p>
             <a:fld id="{EBFE5809-C24E-4064-B123-6E0B0B45228D}" type="datetimeFigureOut">
               <a:rPr lang="en-US" smtClean="0"/>
-              <a:t>3/19/2017</a:t>
+              <a:pPr/>
+              <a:t>3/22/2017</a:t>
             </a:fld>
             <a:endParaRPr lang="en-US"/>
           </a:p>
@@ -835,6 +843,7 @@
           <a:p>
             <a:fld id="{CB0C188A-6774-43C7-A243-7949E5A0860B}" type="slidenum">
               <a:rPr lang="en-US" smtClean="0"/>
+              <a:pPr/>
               <a:t>‹#›</a:t>
             </a:fld>
             <a:endParaRPr lang="en-US"/>
@@ -1034,7 +1043,8 @@
           <a:p>
             <a:fld id="{EBFE5809-C24E-4064-B123-6E0B0B45228D}" type="datetimeFigureOut">
               <a:rPr lang="en-US" smtClean="0"/>
-              <a:t>3/19/2017</a:t>
+              <a:pPr/>
+              <a:t>3/22/2017</a:t>
             </a:fld>
             <a:endParaRPr lang="en-US"/>
           </a:p>
@@ -1076,6 +1086,7 @@
           <a:p>
             <a:fld id="{CB0C188A-6774-43C7-A243-7949E5A0860B}" type="slidenum">
               <a:rPr lang="en-US" smtClean="0"/>
+              <a:pPr/>
               <a:t>‹#›</a:t>
             </a:fld>
             <a:endParaRPr lang="en-US"/>
@@ -1317,7 +1328,8 @@
           <a:p>
             <a:fld id="{EBFE5809-C24E-4064-B123-6E0B0B45228D}" type="datetimeFigureOut">
               <a:rPr lang="en-US" smtClean="0"/>
-              <a:t>3/19/2017</a:t>
+              <a:pPr/>
+              <a:t>3/22/2017</a:t>
             </a:fld>
             <a:endParaRPr lang="en-US"/>
           </a:p>
@@ -1359,6 +1371,7 @@
           <a:p>
             <a:fld id="{CB0C188A-6774-43C7-A243-7949E5A0860B}" type="slidenum">
               <a:rPr lang="en-US" smtClean="0"/>
+              <a:pPr/>
               <a:t>‹#›</a:t>
             </a:fld>
             <a:endParaRPr lang="en-US"/>
@@ -1734,7 +1747,8 @@
           <a:p>
             <a:fld id="{EBFE5809-C24E-4064-B123-6E0B0B45228D}" type="datetimeFigureOut">
               <a:rPr lang="en-US" smtClean="0"/>
-              <a:t>3/19/2017</a:t>
+              <a:pPr/>
+              <a:t>3/22/2017</a:t>
             </a:fld>
             <a:endParaRPr lang="en-US"/>
           </a:p>
@@ -1776,6 +1790,7 @@
           <a:p>
             <a:fld id="{CB0C188A-6774-43C7-A243-7949E5A0860B}" type="slidenum">
               <a:rPr lang="en-US" smtClean="0"/>
+              <a:pPr/>
               <a:t>‹#›</a:t>
             </a:fld>
             <a:endParaRPr lang="en-US"/>
@@ -1847,7 +1862,8 @@
           <a:p>
             <a:fld id="{EBFE5809-C24E-4064-B123-6E0B0B45228D}" type="datetimeFigureOut">
               <a:rPr lang="en-US" smtClean="0"/>
-              <a:t>3/19/2017</a:t>
+              <a:pPr/>
+              <a:t>3/22/2017</a:t>
             </a:fld>
             <a:endParaRPr lang="en-US"/>
           </a:p>
@@ -1889,6 +1905,7 @@
           <a:p>
             <a:fld id="{CB0C188A-6774-43C7-A243-7949E5A0860B}" type="slidenum">
               <a:rPr lang="en-US" smtClean="0"/>
+              <a:pPr/>
               <a:t>‹#›</a:t>
             </a:fld>
             <a:endParaRPr lang="en-US"/>
@@ -1937,7 +1954,8 @@
           <a:p>
             <a:fld id="{EBFE5809-C24E-4064-B123-6E0B0B45228D}" type="datetimeFigureOut">
               <a:rPr lang="en-US" smtClean="0"/>
-              <a:t>3/19/2017</a:t>
+              <a:pPr/>
+              <a:t>3/22/2017</a:t>
             </a:fld>
             <a:endParaRPr lang="en-US"/>
           </a:p>
@@ -1979,6 +1997,7 @@
           <a:p>
             <a:fld id="{CB0C188A-6774-43C7-A243-7949E5A0860B}" type="slidenum">
               <a:rPr lang="en-US" smtClean="0"/>
+              <a:pPr/>
               <a:t>‹#›</a:t>
             </a:fld>
             <a:endParaRPr lang="en-US"/>
@@ -2209,7 +2228,8 @@
           <a:p>
             <a:fld id="{EBFE5809-C24E-4064-B123-6E0B0B45228D}" type="datetimeFigureOut">
               <a:rPr lang="en-US" smtClean="0"/>
-              <a:t>3/19/2017</a:t>
+              <a:pPr/>
+              <a:t>3/22/2017</a:t>
             </a:fld>
             <a:endParaRPr lang="en-US"/>
           </a:p>
@@ -2251,6 +2271,7 @@
           <a:p>
             <a:fld id="{CB0C188A-6774-43C7-A243-7949E5A0860B}" type="slidenum">
               <a:rPr lang="en-US" smtClean="0"/>
+              <a:pPr/>
               <a:t>‹#›</a:t>
             </a:fld>
             <a:endParaRPr lang="en-US"/>
@@ -2457,7 +2478,8 @@
           <a:p>
             <a:fld id="{EBFE5809-C24E-4064-B123-6E0B0B45228D}" type="datetimeFigureOut">
               <a:rPr lang="en-US" smtClean="0"/>
-              <a:t>3/19/2017</a:t>
+              <a:pPr/>
+              <a:t>3/22/2017</a:t>
             </a:fld>
             <a:endParaRPr lang="en-US"/>
           </a:p>
@@ -2499,6 +2521,7 @@
           <a:p>
             <a:fld id="{CB0C188A-6774-43C7-A243-7949E5A0860B}" type="slidenum">
               <a:rPr lang="en-US" smtClean="0"/>
+              <a:pPr/>
               <a:t>‹#›</a:t>
             </a:fld>
             <a:endParaRPr lang="en-US"/>
@@ -2665,7 +2688,8 @@
           <a:p>
             <a:fld id="{EBFE5809-C24E-4064-B123-6E0B0B45228D}" type="datetimeFigureOut">
               <a:rPr lang="en-US" smtClean="0"/>
-              <a:t>3/19/2017</a:t>
+              <a:pPr/>
+              <a:t>3/22/2017</a:t>
             </a:fld>
             <a:endParaRPr lang="en-US"/>
           </a:p>
@@ -2743,6 +2767,7 @@
           <a:p>
             <a:fld id="{CB0C188A-6774-43C7-A243-7949E5A0860B}" type="slidenum">
               <a:rPr lang="en-US" smtClean="0"/>
+              <a:pPr/>
               <a:t>‹#›</a:t>
             </a:fld>
             <a:endParaRPr lang="en-US"/>
@@ -4934,6 +4959,115 @@
 </p:sld>
 </file>
 
+<file path=ppt/slides/slide2.xml><?xml version="1.0" encoding="utf-8"?>
+<p:sld xmlns:a="http://schemas.openxmlformats.org/drawingml/2006/main" xmlns:r="http://schemas.openxmlformats.org/officeDocument/2006/relationships" xmlns:p="http://schemas.openxmlformats.org/presentationml/2006/main">
+  <p:cSld>
+    <p:spTree>
+      <p:nvGrpSpPr>
+        <p:cNvPr id="1" name=""/>
+        <p:cNvGrpSpPr/>
+        <p:nvPr/>
+      </p:nvGrpSpPr>
+      <p:grpSpPr>
+        <a:xfrm>
+          <a:off x="0" y="0"/>
+          <a:ext cx="0" cy="0"/>
+          <a:chOff x="0" y="0"/>
+          <a:chExt cx="0" cy="0"/>
+        </a:xfrm>
+      </p:grpSpPr>
+      <p:sp>
+        <p:nvSpPr>
+          <p:cNvPr id="1026" name="AutoShape 2" descr="Displaying advanced neural nte figure.png"/>
+          <p:cNvSpPr>
+            <a:spLocks noChangeAspect="1" noChangeArrowheads="1"/>
+          </p:cNvSpPr>
+          <p:nvPr/>
+        </p:nvSpPr>
+        <p:spPr bwMode="auto">
+          <a:xfrm>
+            <a:off x="155575" y="-144463"/>
+            <a:ext cx="304800" cy="304801"/>
+          </a:xfrm>
+          <a:prstGeom prst="rect">
+            <a:avLst/>
+          </a:prstGeom>
+          <a:noFill/>
+        </p:spPr>
+        <p:txBody>
+          <a:bodyPr vert="horz" wrap="square" lIns="91440" tIns="45720" rIns="91440" bIns="45720" numCol="1" anchor="t" anchorCtr="0" compatLnSpc="1">
+            <a:prstTxWarp prst="textNoShape">
+              <a:avLst/>
+            </a:prstTxWarp>
+          </a:bodyPr>
+          <a:lstStyle/>
+          <a:p>
+            <a:endParaRPr lang="en-US"/>
+          </a:p>
+        </p:txBody>
+      </p:sp>
+      <p:sp>
+        <p:nvSpPr>
+          <p:cNvPr id="1028" name="AutoShape 4" descr="Displaying advanced neural nte figure.png"/>
+          <p:cNvSpPr>
+            <a:spLocks noChangeAspect="1" noChangeArrowheads="1"/>
+          </p:cNvSpPr>
+          <p:nvPr/>
+        </p:nvSpPr>
+        <p:spPr bwMode="auto">
+          <a:xfrm>
+            <a:off x="155575" y="-144463"/>
+            <a:ext cx="304800" cy="304801"/>
+          </a:xfrm>
+          <a:prstGeom prst="rect">
+            <a:avLst/>
+          </a:prstGeom>
+          <a:noFill/>
+        </p:spPr>
+        <p:txBody>
+          <a:bodyPr vert="horz" wrap="square" lIns="91440" tIns="45720" rIns="91440" bIns="45720" numCol="1" anchor="t" anchorCtr="0" compatLnSpc="1">
+            <a:prstTxWarp prst="textNoShape">
+              <a:avLst/>
+            </a:prstTxWarp>
+          </a:bodyPr>
+          <a:lstStyle/>
+          <a:p>
+            <a:endParaRPr lang="en-US"/>
+          </a:p>
+        </p:txBody>
+      </p:sp>
+      <p:pic>
+        <p:nvPicPr>
+          <p:cNvPr id="6" name="Picture 5" descr="advanced neural nte figure.png"/>
+          <p:cNvPicPr>
+            <a:picLocks noChangeAspect="1"/>
+          </p:cNvPicPr>
+          <p:nvPr/>
+        </p:nvPicPr>
+        <p:blipFill>
+          <a:blip r:embed="rId2"/>
+          <a:stretch>
+            <a:fillRect/>
+          </a:stretch>
+        </p:blipFill>
+        <p:spPr>
+          <a:xfrm>
+            <a:off x="152400" y="1143000"/>
+            <a:ext cx="8606841" cy="2474772"/>
+          </a:xfrm>
+          <a:prstGeom prst="rect">
+            <a:avLst/>
+          </a:prstGeom>
+        </p:spPr>
+      </p:pic>
+    </p:spTree>
+  </p:cSld>
+  <p:clrMapOvr>
+    <a:masterClrMapping/>
+  </p:clrMapOvr>
+</p:sld>
+</file>
+
 <file path=ppt/theme/theme1.xml><?xml version="1.0" encoding="utf-8"?>
 <a:theme xmlns:a="http://schemas.openxmlformats.org/drawingml/2006/main" name="Office Theme">
   <a:themeElements>

</xml_diff>